<commit_message>
updated day 1 files
</commit_message>
<xml_diff>
--- a/Day1/1c_Parameters/Parameters in ADMB.pptx
+++ b/Day1/1c_Parameters/Parameters in ADMB.pptx
@@ -281,7 +281,7 @@
             <a:fld id="{CA0CBF02-D954-4C9B-B5EF-B8EADB0DBEEA}" type="datetimeFigureOut">
               <a:rPr lang="en-US" smtClean="0"/>
               <a:pPr/>
-              <a:t>3/8/2018</a:t>
+              <a:t>3/13/2018</a:t>
             </a:fld>
             <a:endParaRPr lang="en-US"/>
           </a:p>
@@ -492,7 +492,7 @@
           <a:p>
             <a:fld id="{CA0CBF02-D954-4C9B-B5EF-B8EADB0DBEEA}" type="datetimeFigureOut">
               <a:rPr lang="en-US" smtClean="0"/>
-              <a:t>3/8/2018</a:t>
+              <a:t>3/13/2018</a:t>
             </a:fld>
             <a:endParaRPr lang="en-US"/>
           </a:p>
@@ -700,7 +700,7 @@
           <a:p>
             <a:fld id="{CA0CBF02-D954-4C9B-B5EF-B8EADB0DBEEA}" type="datetimeFigureOut">
               <a:rPr lang="en-US" smtClean="0"/>
-              <a:t>3/8/2018</a:t>
+              <a:t>3/13/2018</a:t>
             </a:fld>
             <a:endParaRPr lang="en-US"/>
           </a:p>
@@ -937,7 +937,7 @@
             <a:fld id="{CA0CBF02-D954-4C9B-B5EF-B8EADB0DBEEA}" type="datetimeFigureOut">
               <a:rPr lang="en-US" smtClean="0"/>
               <a:pPr/>
-              <a:t>3/8/2018</a:t>
+              <a:t>3/13/2018</a:t>
             </a:fld>
             <a:endParaRPr lang="en-US"/>
           </a:p>
@@ -1225,7 +1225,7 @@
           <a:p>
             <a:fld id="{CA0CBF02-D954-4C9B-B5EF-B8EADB0DBEEA}" type="datetimeFigureOut">
               <a:rPr lang="en-US" smtClean="0"/>
-              <a:t>3/8/2018</a:t>
+              <a:t>3/13/2018</a:t>
             </a:fld>
             <a:endParaRPr lang="en-US"/>
           </a:p>
@@ -1490,7 +1490,7 @@
           <a:p>
             <a:fld id="{CA0CBF02-D954-4C9B-B5EF-B8EADB0DBEEA}" type="datetimeFigureOut">
               <a:rPr lang="en-US" smtClean="0"/>
-              <a:t>3/8/2018</a:t>
+              <a:t>3/13/2018</a:t>
             </a:fld>
             <a:endParaRPr lang="en-US"/>
           </a:p>
@@ -1902,7 +1902,7 @@
           <a:p>
             <a:fld id="{CA0CBF02-D954-4C9B-B5EF-B8EADB0DBEEA}" type="datetimeFigureOut">
               <a:rPr lang="en-US" smtClean="0"/>
-              <a:t>3/8/2018</a:t>
+              <a:t>3/13/2018</a:t>
             </a:fld>
             <a:endParaRPr lang="en-US"/>
           </a:p>
@@ -2043,7 +2043,7 @@
           <a:p>
             <a:fld id="{CA0CBF02-D954-4C9B-B5EF-B8EADB0DBEEA}" type="datetimeFigureOut">
               <a:rPr lang="en-US" smtClean="0"/>
-              <a:t>3/8/2018</a:t>
+              <a:t>3/13/2018</a:t>
             </a:fld>
             <a:endParaRPr lang="en-US"/>
           </a:p>
@@ -2156,7 +2156,7 @@
           <a:p>
             <a:fld id="{CA0CBF02-D954-4C9B-B5EF-B8EADB0DBEEA}" type="datetimeFigureOut">
               <a:rPr lang="en-US" smtClean="0"/>
-              <a:t>3/8/2018</a:t>
+              <a:t>3/13/2018</a:t>
             </a:fld>
             <a:endParaRPr lang="en-US"/>
           </a:p>
@@ -2467,7 +2467,7 @@
           <a:p>
             <a:fld id="{CA0CBF02-D954-4C9B-B5EF-B8EADB0DBEEA}" type="datetimeFigureOut">
               <a:rPr lang="en-US" smtClean="0"/>
-              <a:t>3/8/2018</a:t>
+              <a:t>3/13/2018</a:t>
             </a:fld>
             <a:endParaRPr lang="en-US"/>
           </a:p>
@@ -2755,7 +2755,7 @@
           <a:p>
             <a:fld id="{CA0CBF02-D954-4C9B-B5EF-B8EADB0DBEEA}" type="datetimeFigureOut">
               <a:rPr lang="en-US" smtClean="0"/>
-              <a:t>3/8/2018</a:t>
+              <a:t>3/13/2018</a:t>
             </a:fld>
             <a:endParaRPr lang="en-US"/>
           </a:p>
@@ -2996,7 +2996,7 @@
           <a:p>
             <a:fld id="{CA0CBF02-D954-4C9B-B5EF-B8EADB0DBEEA}" type="datetimeFigureOut">
               <a:rPr lang="en-US" smtClean="0"/>
-              <a:t>3/8/2018</a:t>
+              <a:t>3/13/2018</a:t>
             </a:fld>
             <a:endParaRPr lang="en-US"/>
           </a:p>
@@ -3524,8 +3524,8 @@
           </a:p>
         </p:txBody>
       </p:sp>
-      <mc:AlternateContent xmlns:mc="http://schemas.openxmlformats.org/markup-compatibility/2006">
-        <mc:Choice xmlns:a14="http://schemas.microsoft.com/office/drawing/2010/main" Requires="a14">
+      <mc:AlternateContent xmlns:mc="http://schemas.openxmlformats.org/markup-compatibility/2006" xmlns:a14="http://schemas.microsoft.com/office/drawing/2010/main">
+        <mc:Choice Requires="a14">
           <p:sp>
             <p:nvSpPr>
               <p:cNvPr id="3" name="Content Placeholder 2">
@@ -3694,7 +3694,7 @@
             </p:txBody>
           </p:sp>
         </mc:Choice>
-        <mc:Fallback>
+        <mc:Fallback xmlns="">
           <p:sp>
             <p:nvSpPr>
               <p:cNvPr id="3" name="Content Placeholder 2">
@@ -5416,7 +5416,7 @@
           <p:nvPr>
             <p:extLst>
               <p:ext uri="{D42A27DB-BD31-4B8C-83A1-F6EECF244321}">
-                <p14:modId xmlns:p14="http://schemas.microsoft.com/office/powerpoint/2010/main" val="1249168498"/>
+                <p14:modId xmlns:p14="http://schemas.microsoft.com/office/powerpoint/2010/main" val="1068993593"/>
               </p:ext>
             </p:extLst>
           </p:nvPr>
@@ -5644,7 +5644,7 @@
                         <a:rPr lang="en-US" dirty="0" err="1">
                           <a:latin typeface="Helvetica" panose="020B0504020202030204" pitchFamily="34" charset="0"/>
                         </a:rPr>
-                        <a:t>init_bounded_number</a:t>
+                        <a:t>init_bounded_vector</a:t>
                       </a:r>
                       <a:r>
                         <a:rPr lang="en-US" dirty="0">

</xml_diff>